<commit_message>
L8 Notes + L9 Slides
</commit_message>
<xml_diff>
--- a/Lecture10_BehavioralHealthEcon1/L10Slides_BehavioralHealth_2023W.pptx
+++ b/Lecture10_BehavioralHealthEcon1/L10Slides_BehavioralHealth_2023W.pptx
@@ -217,7 +217,7 @@
           <a:p>
             <a:fld id="{EF911157-0FC2-4F06-8D61-FD647FE4E19D}" type="datetimeFigureOut">
               <a:rPr lang="en-US" smtClean="0"/>
-              <a:t>10/24/2022</a:t>
+              <a:t>3/13/2023</a:t>
             </a:fld>
             <a:endParaRPr lang="en-US"/>
           </a:p>
@@ -1278,7 +1278,7 @@
             <a:fld id="{0972D05C-DCFB-4BB6-B49C-AC126BF3ED2C}" type="datetimeFigureOut">
               <a:rPr lang="en-US" smtClean="0"/>
               <a:pPr/>
-              <a:t>10/24/2022</a:t>
+              <a:t>3/13/2023</a:t>
             </a:fld>
             <a:endParaRPr lang="en-US"/>
           </a:p>
@@ -1508,7 +1508,7 @@
             <a:fld id="{0972D05C-DCFB-4BB6-B49C-AC126BF3ED2C}" type="datetimeFigureOut">
               <a:rPr lang="en-US" smtClean="0"/>
               <a:pPr/>
-              <a:t>10/24/2022</a:t>
+              <a:t>3/13/2023</a:t>
             </a:fld>
             <a:endParaRPr lang="en-US"/>
           </a:p>
@@ -1690,7 +1690,7 @@
             <a:fld id="{0972D05C-DCFB-4BB6-B49C-AC126BF3ED2C}" type="datetimeFigureOut">
               <a:rPr lang="en-US" smtClean="0"/>
               <a:pPr/>
-              <a:t>10/24/2022</a:t>
+              <a:t>3/13/2023</a:t>
             </a:fld>
             <a:endParaRPr lang="en-US"/>
           </a:p>
@@ -1862,7 +1862,7 @@
             <a:fld id="{0972D05C-DCFB-4BB6-B49C-AC126BF3ED2C}" type="datetimeFigureOut">
               <a:rPr lang="en-US" smtClean="0"/>
               <a:pPr/>
-              <a:t>10/24/2022</a:t>
+              <a:t>3/13/2023</a:t>
             </a:fld>
             <a:endParaRPr lang="en-US"/>
           </a:p>
@@ -2118,7 +2118,7 @@
             <a:fld id="{0972D05C-DCFB-4BB6-B49C-AC126BF3ED2C}" type="datetimeFigureOut">
               <a:rPr lang="en-US" smtClean="0"/>
               <a:pPr/>
-              <a:t>10/24/2022</a:t>
+              <a:t>3/13/2023</a:t>
             </a:fld>
             <a:endParaRPr lang="en-US"/>
           </a:p>
@@ -2446,7 +2446,7 @@
             <a:fld id="{0972D05C-DCFB-4BB6-B49C-AC126BF3ED2C}" type="datetimeFigureOut">
               <a:rPr lang="en-US" smtClean="0"/>
               <a:pPr/>
-              <a:t>10/24/2022</a:t>
+              <a:t>3/13/2023</a:t>
             </a:fld>
             <a:endParaRPr lang="en-US"/>
           </a:p>
@@ -2899,7 +2899,7 @@
             <a:fld id="{0972D05C-DCFB-4BB6-B49C-AC126BF3ED2C}" type="datetimeFigureOut">
               <a:rPr lang="en-US" smtClean="0"/>
               <a:pPr/>
-              <a:t>10/24/2022</a:t>
+              <a:t>3/13/2023</a:t>
             </a:fld>
             <a:endParaRPr lang="en-US"/>
           </a:p>
@@ -3019,7 +3019,7 @@
             <a:fld id="{0972D05C-DCFB-4BB6-B49C-AC126BF3ED2C}" type="datetimeFigureOut">
               <a:rPr lang="en-US" smtClean="0"/>
               <a:pPr/>
-              <a:t>10/24/2022</a:t>
+              <a:t>3/13/2023</a:t>
             </a:fld>
             <a:endParaRPr lang="en-US"/>
           </a:p>
@@ -3116,7 +3116,7 @@
             <a:fld id="{0972D05C-DCFB-4BB6-B49C-AC126BF3ED2C}" type="datetimeFigureOut">
               <a:rPr lang="en-US" smtClean="0"/>
               <a:pPr/>
-              <a:t>10/24/2022</a:t>
+              <a:t>3/13/2023</a:t>
             </a:fld>
             <a:endParaRPr lang="en-US"/>
           </a:p>
@@ -3405,7 +3405,7 @@
             <a:fld id="{0972D05C-DCFB-4BB6-B49C-AC126BF3ED2C}" type="datetimeFigureOut">
               <a:rPr lang="en-US" smtClean="0"/>
               <a:pPr/>
-              <a:t>10/24/2022</a:t>
+              <a:t>3/13/2023</a:t>
             </a:fld>
             <a:endParaRPr lang="en-US"/>
           </a:p>
@@ -3729,7 +3729,7 @@
             <a:fld id="{0972D05C-DCFB-4BB6-B49C-AC126BF3ED2C}" type="datetimeFigureOut">
               <a:rPr lang="en-US" smtClean="0"/>
               <a:pPr/>
-              <a:t>10/24/2022</a:t>
+              <a:t>3/13/2023</a:t>
             </a:fld>
             <a:endParaRPr lang="en-US"/>
           </a:p>
@@ -3984,7 +3984,7 @@
             <a:fld id="{0972D05C-DCFB-4BB6-B49C-AC126BF3ED2C}" type="datetimeFigureOut">
               <a:rPr lang="en-US" smtClean="0"/>
               <a:pPr/>
-              <a:t>10/24/2022</a:t>
+              <a:t>3/13/2023</a:t>
             </a:fld>
             <a:endParaRPr lang="en-US" dirty="0"/>
           </a:p>
@@ -5867,6 +5867,53 @@
           </a:p>
         </p:txBody>
       </p:sp>
+      <p:pic>
+        <p:nvPicPr>
+          <p:cNvPr id="1026" name="Picture 2" descr="What is Behavioral Economics? - Irrational Labs">
+            <a:extLst>
+              <a:ext uri="{FF2B5EF4-FFF2-40B4-BE49-F238E27FC236}">
+                <a16:creationId xmlns:a16="http://schemas.microsoft.com/office/drawing/2014/main" id="{1266B32B-0075-C05B-397B-C809B0B8ADF0}"/>
+              </a:ext>
+            </a:extLst>
+          </p:cNvPr>
+          <p:cNvPicPr>
+            <a:picLocks noChangeAspect="1" noChangeArrowheads="1"/>
+          </p:cNvPicPr>
+          <p:nvPr/>
+        </p:nvPicPr>
+        <p:blipFill>
+          <a:blip r:embed="rId3">
+            <a:extLst>
+              <a:ext uri="{28A0092B-C50C-407E-A947-70E740481C1C}">
+                <a14:useLocalDpi xmlns:a14="http://schemas.microsoft.com/office/drawing/2010/main" val="0"/>
+              </a:ext>
+            </a:extLst>
+          </a:blip>
+          <a:srcRect/>
+          <a:stretch>
+            <a:fillRect/>
+          </a:stretch>
+        </p:blipFill>
+        <p:spPr bwMode="auto">
+          <a:xfrm>
+            <a:off x="4619625" y="2657475"/>
+            <a:ext cx="2952750" cy="1543050"/>
+          </a:xfrm>
+          <a:prstGeom prst="rect">
+            <a:avLst/>
+          </a:prstGeom>
+          <a:noFill/>
+          <a:extLst>
+            <a:ext uri="{909E8E84-426E-40DD-AFC4-6F175D3DCCD1}">
+              <a14:hiddenFill xmlns:a14="http://schemas.microsoft.com/office/drawing/2010/main">
+                <a:solidFill>
+                  <a:srgbClr val="FFFFFF"/>
+                </a:solidFill>
+              </a14:hiddenFill>
+            </a:ext>
+          </a:extLst>
+        </p:spPr>
+      </p:pic>
     </p:spTree>
     <p:extLst>
       <p:ext uri="{BB962C8B-B14F-4D97-AF65-F5344CB8AC3E}">

</xml_diff>